<commit_message>
Updated code and pdf
</commit_message>
<xml_diff>
--- a/deep-learning/rental-airbnb/boston_ppt.pptx
+++ b/deep-learning/rental-airbnb/boston_ppt.pptx
@@ -514,7 +514,7 @@
           <a:p>
             <a:fld id="{8AA38D85-24D1-674D-9871-7CB952EC61B3}" type="datetimeFigureOut">
               <a:rPr lang="en-CO" smtClean="0"/>
-              <a:t>2/2/22</a:t>
+              <a:t>2/9/22</a:t>
             </a:fld>
             <a:endParaRPr lang="en-CO"/>
           </a:p>
@@ -1099,7 +1099,7 @@
           <a:p>
             <a:fld id="{41A30429-C8C9-7241-8D40-6CDE9C35FE86}" type="datetime1">
               <a:rPr lang="en-US" smtClean="0"/>
-              <a:t>2/2/22</a:t>
+              <a:t>2/9/22</a:t>
             </a:fld>
             <a:endParaRPr lang="en-US"/>
           </a:p>
@@ -1299,7 +1299,7 @@
           <a:p>
             <a:fld id="{F6ACB86D-687D-2D44-8415-2E28D8F4EA5E}" type="datetime1">
               <a:rPr lang="en-US" smtClean="0"/>
-              <a:t>2/2/22</a:t>
+              <a:t>2/9/22</a:t>
             </a:fld>
             <a:endParaRPr lang="en-US"/>
           </a:p>
@@ -1509,7 +1509,7 @@
           <a:p>
             <a:fld id="{75A67C6A-DE21-354F-8AA3-FA67E63BDDFA}" type="datetime1">
               <a:rPr lang="en-US" smtClean="0"/>
-              <a:t>2/2/22</a:t>
+              <a:t>2/9/22</a:t>
             </a:fld>
             <a:endParaRPr lang="en-US"/>
           </a:p>
@@ -1709,7 +1709,7 @@
           <a:p>
             <a:fld id="{359B20A9-FCF9-B243-A57F-4AB6E0A0F03F}" type="datetime1">
               <a:rPr lang="en-US" smtClean="0"/>
-              <a:t>2/2/22</a:t>
+              <a:t>2/9/22</a:t>
             </a:fld>
             <a:endParaRPr lang="en-US"/>
           </a:p>
@@ -1985,7 +1985,7 @@
           <a:p>
             <a:fld id="{47C1D1DA-9F15-164E-99C6-987EC3ABB480}" type="datetime1">
               <a:rPr lang="en-US" smtClean="0"/>
-              <a:t>2/2/22</a:t>
+              <a:t>2/9/22</a:t>
             </a:fld>
             <a:endParaRPr lang="en-US"/>
           </a:p>
@@ -2253,7 +2253,7 @@
           <a:p>
             <a:fld id="{A7CF8B68-FF24-E043-9CC0-B5DA3C745070}" type="datetime1">
               <a:rPr lang="en-US" smtClean="0"/>
-              <a:t>2/2/22</a:t>
+              <a:t>2/9/22</a:t>
             </a:fld>
             <a:endParaRPr lang="en-US"/>
           </a:p>
@@ -2668,7 +2668,7 @@
           <a:p>
             <a:fld id="{83C87CC2-5E05-FB4A-95B8-F1D2301BCADA}" type="datetime1">
               <a:rPr lang="en-US" smtClean="0"/>
-              <a:t>2/2/22</a:t>
+              <a:t>2/9/22</a:t>
             </a:fld>
             <a:endParaRPr lang="en-US"/>
           </a:p>
@@ -2810,7 +2810,7 @@
           <a:p>
             <a:fld id="{BC307E26-5084-624D-8F06-4E12EC04EBB6}" type="datetime1">
               <a:rPr lang="en-US" smtClean="0"/>
-              <a:t>2/2/22</a:t>
+              <a:t>2/9/22</a:t>
             </a:fld>
             <a:endParaRPr lang="en-US"/>
           </a:p>
@@ -2923,7 +2923,7 @@
           <a:p>
             <a:fld id="{F885D8E1-52E0-3840-843C-2F0B2CB5D4AE}" type="datetime1">
               <a:rPr lang="en-US" smtClean="0"/>
-              <a:t>2/2/22</a:t>
+              <a:t>2/9/22</a:t>
             </a:fld>
             <a:endParaRPr lang="en-US"/>
           </a:p>
@@ -3236,7 +3236,7 @@
           <a:p>
             <a:fld id="{30057272-A396-1945-94EC-6EF3D89918FE}" type="datetime1">
               <a:rPr lang="en-US" smtClean="0"/>
-              <a:t>2/2/22</a:t>
+              <a:t>2/9/22</a:t>
             </a:fld>
             <a:endParaRPr lang="en-US"/>
           </a:p>
@@ -3525,7 +3525,7 @@
           <a:p>
             <a:fld id="{27E387C1-F147-1343-8D1D-F2F8B9EA7682}" type="datetime1">
               <a:rPr lang="en-US" smtClean="0"/>
-              <a:t>2/2/22</a:t>
+              <a:t>2/9/22</a:t>
             </a:fld>
             <a:endParaRPr lang="en-US"/>
           </a:p>
@@ -3768,7 +3768,7 @@
           <a:p>
             <a:fld id="{43A37A15-304C-9A48-915A-DB5DF5AC626B}" type="datetime1">
               <a:rPr lang="en-US" smtClean="0"/>
-              <a:t>2/2/22</a:t>
+              <a:t>2/9/22</a:t>
             </a:fld>
             <a:endParaRPr lang="en-US" dirty="0"/>
           </a:p>
@@ -6303,7 +6303,7 @@
           <p:nvPr>
             <p:extLst>
               <p:ext uri="{D42A27DB-BD31-4B8C-83A1-F6EECF244321}">
-                <p14:modId xmlns:p14="http://schemas.microsoft.com/office/powerpoint/2010/main" val="4139191596"/>
+                <p14:modId xmlns:p14="http://schemas.microsoft.com/office/powerpoint/2010/main" val="2352173425"/>
               </p:ext>
             </p:extLst>
           </p:nvPr>
@@ -6445,7 +6445,7 @@
                       <a:pPr algn="ctr"/>
                       <a:r>
                         <a:rPr lang="en-CO" dirty="0"/>
-                        <a:t>12.025</a:t>
+                        <a:t>2.938</a:t>
                       </a:r>
                     </a:p>
                   </a:txBody>
@@ -6507,7 +6507,7 @@
                       <a:pPr algn="ctr"/>
                       <a:r>
                         <a:rPr lang="en-CO" dirty="0"/>
-                        <a:t>2.938</a:t>
+                        <a:t>2.975</a:t>
                       </a:r>
                     </a:p>
                   </a:txBody>
@@ -6754,8 +6754,8 @@
           </a:graphicData>
         </a:graphic>
       </p:graphicFrame>
-      <mc:AlternateContent xmlns:mc="http://schemas.openxmlformats.org/markup-compatibility/2006">
-        <mc:Choice xmlns:p14="http://schemas.microsoft.com/office/powerpoint/2010/main" Requires="p14">
+      <mc:AlternateContent xmlns:mc="http://schemas.openxmlformats.org/markup-compatibility/2006" xmlns:p14="http://schemas.microsoft.com/office/powerpoint/2010/main">
+        <mc:Choice Requires="p14">
           <p:contentPart p14:bwMode="auto" r:id="rId2">
             <p14:nvContentPartPr>
               <p14:cNvPr id="11" name="Ink 10">
@@ -6769,12 +6769,12 @@
               <p14:nvPr/>
             </p14:nvContentPartPr>
             <p14:xfrm>
-              <a:off x="6607687" y="3124281"/>
+              <a:off x="6678066" y="2483150"/>
               <a:ext cx="144720" cy="3240"/>
             </p14:xfrm>
           </p:contentPart>
         </mc:Choice>
-        <mc:Fallback>
+        <mc:Fallback xmlns="">
           <p:pic>
             <p:nvPicPr>
               <p:cNvPr id="11" name="Ink 10">
@@ -6795,7 +6795,7 @@
             </p:blipFill>
             <p:spPr>
               <a:xfrm>
-                <a:off x="6571687" y="3052281"/>
+                <a:off x="6642066" y="2411150"/>
                 <a:ext cx="216360" cy="146880"/>
               </a:xfrm>
               <a:prstGeom prst="rect">
@@ -6805,8 +6805,8 @@
           </p:pic>
         </mc:Fallback>
       </mc:AlternateContent>
-      <mc:AlternateContent xmlns:mc="http://schemas.openxmlformats.org/markup-compatibility/2006">
-        <mc:Choice xmlns:p14="http://schemas.microsoft.com/office/powerpoint/2010/main" Requires="p14">
+      <mc:AlternateContent xmlns:mc="http://schemas.openxmlformats.org/markup-compatibility/2006" xmlns:p14="http://schemas.microsoft.com/office/powerpoint/2010/main">
+        <mc:Choice Requires="p14">
           <p:contentPart p14:bwMode="auto" r:id="rId4">
             <p14:nvContentPartPr>
               <p14:cNvPr id="12" name="Ink 11">
@@ -6825,7 +6825,7 @@
             </p14:xfrm>
           </p:contentPart>
         </mc:Choice>
-        <mc:Fallback>
+        <mc:Fallback xmlns="">
           <p:pic>
             <p:nvPicPr>
               <p:cNvPr id="12" name="Ink 11">
@@ -7686,7 +7686,7 @@
           <a:p>
             <a:r>
               <a:rPr lang="en-CO" sz="2400" dirty="0"/>
-              <a:t>In general, Neural Network model performs as good as other models.</a:t>
+              <a:t>In general, Neural Network model performs as well as other models.</a:t>
             </a:r>
           </a:p>
           <a:p>
@@ -17999,44 +17999,6 @@
       </p:cxnSp>
       <p:sp>
         <p:nvSpPr>
-          <p:cNvPr id="32" name="TextBox 31">
-            <a:extLst>
-              <a:ext uri="{FF2B5EF4-FFF2-40B4-BE49-F238E27FC236}">
-                <a16:creationId xmlns:a16="http://schemas.microsoft.com/office/drawing/2014/main" id="{4B0F75BE-DB37-C94D-8560-7DC38208E3FF}"/>
-              </a:ext>
-            </a:extLst>
-          </p:cNvPr>
-          <p:cNvSpPr txBox="1"/>
-          <p:nvPr/>
-        </p:nvSpPr>
-        <p:spPr>
-          <a:xfrm>
-            <a:off x="2810320" y="5662781"/>
-            <a:ext cx="895774" cy="369332"/>
-          </a:xfrm>
-          <a:prstGeom prst="rect">
-            <a:avLst/>
-          </a:prstGeom>
-          <a:noFill/>
-        </p:spPr>
-        <p:txBody>
-          <a:bodyPr wrap="square" rtlCol="0">
-            <a:spAutoFit/>
-          </a:bodyPr>
-          <a:lstStyle/>
-          <a:p>
-            <a:r>
-              <a:rPr lang="en-CO" dirty="0">
-                <a:latin typeface="Apple Chancery" panose="03020702040506060504" pitchFamily="66" charset="-79"/>
-                <a:cs typeface="Apple Chancery" panose="03020702040506060504" pitchFamily="66" charset="-79"/>
-              </a:rPr>
-              <a:t>enough</a:t>
-            </a:r>
-          </a:p>
-        </p:txBody>
-      </p:sp>
-      <p:sp>
-        <p:nvSpPr>
           <p:cNvPr id="33" name="Title 1">
             <a:extLst>
               <a:ext uri="{FF2B5EF4-FFF2-40B4-BE49-F238E27FC236}">
@@ -18100,6 +18062,44 @@
               <a:t>8</a:t>
             </a:fld>
             <a:endParaRPr lang="en-US"/>
+          </a:p>
+        </p:txBody>
+      </p:sp>
+      <p:sp>
+        <p:nvSpPr>
+          <p:cNvPr id="3" name="TextBox 2">
+            <a:extLst>
+              <a:ext uri="{FF2B5EF4-FFF2-40B4-BE49-F238E27FC236}">
+                <a16:creationId xmlns:a16="http://schemas.microsoft.com/office/drawing/2014/main" id="{039434D6-B1B4-264F-A2BC-DA2E88778B12}"/>
+              </a:ext>
+            </a:extLst>
+          </p:cNvPr>
+          <p:cNvSpPr txBox="1"/>
+          <p:nvPr/>
+        </p:nvSpPr>
+        <p:spPr>
+          <a:xfrm>
+            <a:off x="2827640" y="5678096"/>
+            <a:ext cx="861133" cy="369332"/>
+          </a:xfrm>
+          <a:prstGeom prst="rect">
+            <a:avLst/>
+          </a:prstGeom>
+          <a:noFill/>
+        </p:spPr>
+        <p:txBody>
+          <a:bodyPr wrap="none" rtlCol="0">
+            <a:spAutoFit/>
+          </a:bodyPr>
+          <a:lstStyle/>
+          <a:p>
+            <a:r>
+              <a:rPr lang="en-CO" dirty="0">
+                <a:latin typeface="Apple Chancery" panose="03020702040506060504" pitchFamily="66" charset="-79"/>
+                <a:cs typeface="Apple Chancery" panose="03020702040506060504" pitchFamily="66" charset="-79"/>
+              </a:rPr>
+              <a:t>enough</a:t>
+            </a:r>
           </a:p>
         </p:txBody>
       </p:sp>

</xml_diff>